<commit_message>
playing with accuracy and figures
</commit_message>
<xml_diff>
--- a/notes/micro_understandinggdd.pptx
+++ b/notes/micro_understandinggdd.pptx
@@ -15,6 +15,10 @@
     <p:sldId id="262" r:id="rId9"/>
     <p:sldId id="263" r:id="rId10"/>
     <p:sldId id="264" r:id="rId11"/>
+    <p:sldId id="266" r:id="rId12"/>
+    <p:sldId id="267" r:id="rId13"/>
+    <p:sldId id="268" r:id="rId14"/>
+    <p:sldId id="269" r:id="rId15"/>
   </p:sldIdLst>
   <p:sldSz cx="12192000" cy="6858000"/>
   <p:notesSz cx="6858000" cy="9144000"/>
@@ -113,6 +117,11 @@
       </a:defRPr>
     </a:lvl9pPr>
   </p:defaultTextStyle>
+  <p:extLst>
+    <p:ext uri="{EFAFB233-063F-42B5-8137-9DF3F51BA10A}">
+      <p15:sldGuideLst xmlns:p15="http://schemas.microsoft.com/office/powerpoint/2012/main"/>
+    </p:ext>
+  </p:extLst>
 </p:presentation>
 </file>
 
@@ -263,7 +272,7 @@
           <a:p>
             <a:fld id="{99C79061-60FB-E642-9CE4-C311613BDCC2}" type="datetimeFigureOut">
               <a:rPr lang="en-US" smtClean="0"/>
-              <a:t>3/2/21</a:t>
+              <a:t>3/3/21</a:t>
             </a:fld>
             <a:endParaRPr lang="en-US"/>
           </a:p>
@@ -461,7 +470,7 @@
           <a:p>
             <a:fld id="{99C79061-60FB-E642-9CE4-C311613BDCC2}" type="datetimeFigureOut">
               <a:rPr lang="en-US" smtClean="0"/>
-              <a:t>3/2/21</a:t>
+              <a:t>3/3/21</a:t>
             </a:fld>
             <a:endParaRPr lang="en-US"/>
           </a:p>
@@ -669,7 +678,7 @@
           <a:p>
             <a:fld id="{99C79061-60FB-E642-9CE4-C311613BDCC2}" type="datetimeFigureOut">
               <a:rPr lang="en-US" smtClean="0"/>
-              <a:t>3/2/21</a:t>
+              <a:t>3/3/21</a:t>
             </a:fld>
             <a:endParaRPr lang="en-US"/>
           </a:p>
@@ -867,7 +876,7 @@
           <a:p>
             <a:fld id="{99C79061-60FB-E642-9CE4-C311613BDCC2}" type="datetimeFigureOut">
               <a:rPr lang="en-US" smtClean="0"/>
-              <a:t>3/2/21</a:t>
+              <a:t>3/3/21</a:t>
             </a:fld>
             <a:endParaRPr lang="en-US"/>
           </a:p>
@@ -1142,7 +1151,7 @@
           <a:p>
             <a:fld id="{99C79061-60FB-E642-9CE4-C311613BDCC2}" type="datetimeFigureOut">
               <a:rPr lang="en-US" smtClean="0"/>
-              <a:t>3/2/21</a:t>
+              <a:t>3/3/21</a:t>
             </a:fld>
             <a:endParaRPr lang="en-US"/>
           </a:p>
@@ -1407,7 +1416,7 @@
           <a:p>
             <a:fld id="{99C79061-60FB-E642-9CE4-C311613BDCC2}" type="datetimeFigureOut">
               <a:rPr lang="en-US" smtClean="0"/>
-              <a:t>3/2/21</a:t>
+              <a:t>3/3/21</a:t>
             </a:fld>
             <a:endParaRPr lang="en-US"/>
           </a:p>
@@ -1819,7 +1828,7 @@
           <a:p>
             <a:fld id="{99C79061-60FB-E642-9CE4-C311613BDCC2}" type="datetimeFigureOut">
               <a:rPr lang="en-US" smtClean="0"/>
-              <a:t>3/2/21</a:t>
+              <a:t>3/3/21</a:t>
             </a:fld>
             <a:endParaRPr lang="en-US"/>
           </a:p>
@@ -1960,7 +1969,7 @@
           <a:p>
             <a:fld id="{99C79061-60FB-E642-9CE4-C311613BDCC2}" type="datetimeFigureOut">
               <a:rPr lang="en-US" smtClean="0"/>
-              <a:t>3/2/21</a:t>
+              <a:t>3/3/21</a:t>
             </a:fld>
             <a:endParaRPr lang="en-US"/>
           </a:p>
@@ -2073,7 +2082,7 @@
           <a:p>
             <a:fld id="{99C79061-60FB-E642-9CE4-C311613BDCC2}" type="datetimeFigureOut">
               <a:rPr lang="en-US" smtClean="0"/>
-              <a:t>3/2/21</a:t>
+              <a:t>3/3/21</a:t>
             </a:fld>
             <a:endParaRPr lang="en-US"/>
           </a:p>
@@ -2384,7 +2393,7 @@
           <a:p>
             <a:fld id="{99C79061-60FB-E642-9CE4-C311613BDCC2}" type="datetimeFigureOut">
               <a:rPr lang="en-US" smtClean="0"/>
-              <a:t>3/2/21</a:t>
+              <a:t>3/3/21</a:t>
             </a:fld>
             <a:endParaRPr lang="en-US"/>
           </a:p>
@@ -2672,7 +2681,7 @@
           <a:p>
             <a:fld id="{99C79061-60FB-E642-9CE4-C311613BDCC2}" type="datetimeFigureOut">
               <a:rPr lang="en-US" smtClean="0"/>
-              <a:t>3/2/21</a:t>
+              <a:t>3/3/21</a:t>
             </a:fld>
             <a:endParaRPr lang="en-US"/>
           </a:p>
@@ -2913,7 +2922,7 @@
           <a:p>
             <a:fld id="{99C79061-60FB-E642-9CE4-C311613BDCC2}" type="datetimeFigureOut">
               <a:rPr lang="en-US" smtClean="0"/>
-              <a:t>3/2/21</a:t>
+              <a:t>3/3/21</a:t>
             </a:fld>
             <a:endParaRPr lang="en-US"/>
           </a:p>
@@ -3631,6 +3640,633 @@
 </p:sld>
 </file>
 
+<file path=ppt/slides/slide11.xml><?xml version="1.0" encoding="utf-8"?>
+<p:sld xmlns:a="http://schemas.openxmlformats.org/drawingml/2006/main" xmlns:r="http://schemas.openxmlformats.org/officeDocument/2006/relationships" xmlns:p="http://schemas.openxmlformats.org/presentationml/2006/main">
+  <p:cSld>
+    <p:spTree>
+      <p:nvGrpSpPr>
+        <p:cNvPr id="1" name=""/>
+        <p:cNvGrpSpPr/>
+        <p:nvPr/>
+      </p:nvGrpSpPr>
+      <p:grpSpPr>
+        <a:xfrm>
+          <a:off x="0" y="0"/>
+          <a:ext cx="0" cy="0"/>
+          <a:chOff x="0" y="0"/>
+          <a:chExt cx="0" cy="0"/>
+        </a:xfrm>
+      </p:grpSpPr>
+      <p:sp>
+        <p:nvSpPr>
+          <p:cNvPr id="2" name="Title 1">
+            <a:extLst>
+              <a:ext uri="{FF2B5EF4-FFF2-40B4-BE49-F238E27FC236}">
+                <a16:creationId xmlns:a16="http://schemas.microsoft.com/office/drawing/2014/main" id="{63259FED-AD79-7547-BF18-1926E481875F}"/>
+              </a:ext>
+            </a:extLst>
+          </p:cNvPr>
+          <p:cNvSpPr>
+            <a:spLocks noGrp="1"/>
+          </p:cNvSpPr>
+          <p:nvPr>
+            <p:ph type="ctrTitle"/>
+          </p:nvPr>
+        </p:nvSpPr>
+        <p:spPr/>
+        <p:txBody>
+          <a:bodyPr>
+            <a:normAutofit fontScale="90000"/>
+          </a:bodyPr>
+          <a:lstStyle/>
+          <a:p>
+            <a:r>
+              <a:rPr lang="en-US" dirty="0"/>
+              <a:t>Alright so now we want to see if hobo loggers are more accurate estimates of GDD when we have microclimates....</a:t>
+            </a:r>
+          </a:p>
+        </p:txBody>
+      </p:sp>
+    </p:spTree>
+    <p:extLst>
+      <p:ext uri="{BB962C8B-B14F-4D97-AF65-F5344CB8AC3E}">
+        <p14:creationId xmlns:p14="http://schemas.microsoft.com/office/powerpoint/2010/main" val="3033830504"/>
+      </p:ext>
+    </p:extLst>
+  </p:cSld>
+  <p:clrMapOvr>
+    <a:masterClrMapping/>
+  </p:clrMapOvr>
+</p:sld>
+</file>
+
+<file path=ppt/slides/slide12.xml><?xml version="1.0" encoding="utf-8"?>
+<p:sld xmlns:a="http://schemas.openxmlformats.org/drawingml/2006/main" xmlns:r="http://schemas.openxmlformats.org/officeDocument/2006/relationships" xmlns:p="http://schemas.openxmlformats.org/presentationml/2006/main">
+  <p:cSld>
+    <p:spTree>
+      <p:nvGrpSpPr>
+        <p:cNvPr id="1" name=""/>
+        <p:cNvGrpSpPr/>
+        <p:nvPr/>
+      </p:nvGrpSpPr>
+      <p:grpSpPr>
+        <a:xfrm>
+          <a:off x="0" y="0"/>
+          <a:ext cx="0" cy="0"/>
+          <a:chOff x="0" y="0"/>
+          <a:chExt cx="0" cy="0"/>
+        </a:xfrm>
+      </p:grpSpPr>
+      <p:sp>
+        <p:nvSpPr>
+          <p:cNvPr id="2" name="Title 1">
+            <a:extLst>
+              <a:ext uri="{FF2B5EF4-FFF2-40B4-BE49-F238E27FC236}">
+                <a16:creationId xmlns:a16="http://schemas.microsoft.com/office/drawing/2014/main" id="{CBD8B7F2-B13F-C441-9646-AB9907B57CBA}"/>
+              </a:ext>
+            </a:extLst>
+          </p:cNvPr>
+          <p:cNvSpPr>
+            <a:spLocks noGrp="1"/>
+          </p:cNvSpPr>
+          <p:nvPr>
+            <p:ph type="title"/>
+          </p:nvPr>
+        </p:nvSpPr>
+        <p:spPr/>
+        <p:txBody>
+          <a:bodyPr>
+            <a:normAutofit fontScale="90000"/>
+          </a:bodyPr>
+          <a:lstStyle/>
+          <a:p>
+            <a:r>
+              <a:rPr lang="en-US" dirty="0"/>
+              <a:t>So the way that I do this first is to see what microclimates do to our accuracy tests and </a:t>
+            </a:r>
+            <a:r>
+              <a:rPr lang="en-US" dirty="0" err="1"/>
+              <a:t>muplot</a:t>
+            </a:r>
+            <a:endParaRPr lang="en-US" dirty="0"/>
+          </a:p>
+        </p:txBody>
+      </p:sp>
+      <p:pic>
+        <p:nvPicPr>
+          <p:cNvPr id="5" name="Content Placeholder 4">
+            <a:extLst>
+              <a:ext uri="{FF2B5EF4-FFF2-40B4-BE49-F238E27FC236}">
+                <a16:creationId xmlns:a16="http://schemas.microsoft.com/office/drawing/2014/main" id="{1DA89D7F-E1FD-3446-896E-9422C29588AD}"/>
+              </a:ext>
+            </a:extLst>
+          </p:cNvPr>
+          <p:cNvPicPr>
+            <a:picLocks noGrp="1" noChangeAspect="1"/>
+          </p:cNvPicPr>
+          <p:nvPr>
+            <p:ph idx="1"/>
+          </p:nvPr>
+        </p:nvPicPr>
+        <p:blipFill>
+          <a:blip r:embed="rId2"/>
+          <a:stretch>
+            <a:fillRect/>
+          </a:stretch>
+        </p:blipFill>
+        <p:spPr>
+          <a:xfrm>
+            <a:off x="-361168" y="1965975"/>
+            <a:ext cx="8134679" cy="4648388"/>
+          </a:xfrm>
+        </p:spPr>
+      </p:pic>
+      <p:pic>
+        <p:nvPicPr>
+          <p:cNvPr id="11" name="Picture 10">
+            <a:extLst>
+              <a:ext uri="{FF2B5EF4-FFF2-40B4-BE49-F238E27FC236}">
+                <a16:creationId xmlns:a16="http://schemas.microsoft.com/office/drawing/2014/main" id="{5BE38329-7452-4A46-8A03-397ACD682780}"/>
+              </a:ext>
+            </a:extLst>
+          </p:cNvPr>
+          <p:cNvPicPr>
+            <a:picLocks noChangeAspect="1"/>
+          </p:cNvPicPr>
+          <p:nvPr/>
+        </p:nvPicPr>
+        <p:blipFill>
+          <a:blip r:embed="rId3"/>
+          <a:stretch>
+            <a:fillRect/>
+          </a:stretch>
+        </p:blipFill>
+        <p:spPr>
+          <a:xfrm>
+            <a:off x="6583266" y="1176835"/>
+            <a:ext cx="5486400" cy="3657600"/>
+          </a:xfrm>
+          <a:prstGeom prst="rect">
+            <a:avLst/>
+          </a:prstGeom>
+        </p:spPr>
+      </p:pic>
+      <p:pic>
+        <p:nvPicPr>
+          <p:cNvPr id="13" name="Picture 12">
+            <a:extLst>
+              <a:ext uri="{FF2B5EF4-FFF2-40B4-BE49-F238E27FC236}">
+                <a16:creationId xmlns:a16="http://schemas.microsoft.com/office/drawing/2014/main" id="{4D688553-D934-E945-9AF3-848935B32148}"/>
+              </a:ext>
+            </a:extLst>
+          </p:cNvPr>
+          <p:cNvPicPr>
+            <a:picLocks noChangeAspect="1"/>
+          </p:cNvPicPr>
+          <p:nvPr/>
+        </p:nvPicPr>
+        <p:blipFill>
+          <a:blip r:embed="rId4"/>
+          <a:stretch>
+            <a:fillRect/>
+          </a:stretch>
+        </p:blipFill>
+        <p:spPr>
+          <a:xfrm>
+            <a:off x="6583266" y="3745903"/>
+            <a:ext cx="5486400" cy="3657600"/>
+          </a:xfrm>
+          <a:prstGeom prst="rect">
+            <a:avLst/>
+          </a:prstGeom>
+        </p:spPr>
+      </p:pic>
+      <p:sp>
+        <p:nvSpPr>
+          <p:cNvPr id="20" name="TextBox 19">
+            <a:extLst>
+              <a:ext uri="{FF2B5EF4-FFF2-40B4-BE49-F238E27FC236}">
+                <a16:creationId xmlns:a16="http://schemas.microsoft.com/office/drawing/2014/main" id="{ECE8EFF5-BA03-D24F-81DD-C8D5B03DB965}"/>
+              </a:ext>
+            </a:extLst>
+          </p:cNvPr>
+          <p:cNvSpPr txBox="1"/>
+          <p:nvPr/>
+        </p:nvSpPr>
+        <p:spPr>
+          <a:xfrm>
+            <a:off x="1426839" y="1781309"/>
+            <a:ext cx="4567789" cy="369332"/>
+          </a:xfrm>
+          <a:prstGeom prst="rect">
+            <a:avLst/>
+          </a:prstGeom>
+          <a:noFill/>
+        </p:spPr>
+        <p:txBody>
+          <a:bodyPr wrap="none" rtlCol="0">
+            <a:spAutoFit/>
+          </a:bodyPr>
+          <a:lstStyle/>
+          <a:p>
+            <a:r>
+              <a:rPr lang="en-US" dirty="0">
+                <a:solidFill>
+                  <a:srgbClr val="FF0000"/>
+                </a:solidFill>
+              </a:rPr>
+              <a:t>NOISY WEATHER STATION DATA WITH MICROS!</a:t>
+            </a:r>
+          </a:p>
+        </p:txBody>
+      </p:sp>
+    </p:spTree>
+    <p:extLst>
+      <p:ext uri="{BB962C8B-B14F-4D97-AF65-F5344CB8AC3E}">
+        <p14:creationId xmlns:p14="http://schemas.microsoft.com/office/powerpoint/2010/main" val="3804170913"/>
+      </p:ext>
+    </p:extLst>
+  </p:cSld>
+  <p:clrMapOvr>
+    <a:masterClrMapping/>
+  </p:clrMapOvr>
+</p:sld>
+</file>
+
+<file path=ppt/slides/slide13.xml><?xml version="1.0" encoding="utf-8"?>
+<p:sld xmlns:a="http://schemas.openxmlformats.org/drawingml/2006/main" xmlns:r="http://schemas.openxmlformats.org/officeDocument/2006/relationships" xmlns:p="http://schemas.openxmlformats.org/presentationml/2006/main">
+  <p:cSld>
+    <p:spTree>
+      <p:nvGrpSpPr>
+        <p:cNvPr id="1" name=""/>
+        <p:cNvGrpSpPr/>
+        <p:nvPr/>
+      </p:nvGrpSpPr>
+      <p:grpSpPr>
+        <a:xfrm>
+          <a:off x="0" y="0"/>
+          <a:ext cx="0" cy="0"/>
+          <a:chOff x="0" y="0"/>
+          <a:chExt cx="0" cy="0"/>
+        </a:xfrm>
+      </p:grpSpPr>
+      <p:sp>
+        <p:nvSpPr>
+          <p:cNvPr id="20" name="TextBox 19">
+            <a:extLst>
+              <a:ext uri="{FF2B5EF4-FFF2-40B4-BE49-F238E27FC236}">
+                <a16:creationId xmlns:a16="http://schemas.microsoft.com/office/drawing/2014/main" id="{ECE8EFF5-BA03-D24F-81DD-C8D5B03DB965}"/>
+              </a:ext>
+            </a:extLst>
+          </p:cNvPr>
+          <p:cNvSpPr txBox="1"/>
+          <p:nvPr/>
+        </p:nvSpPr>
+        <p:spPr>
+          <a:xfrm>
+            <a:off x="2873515" y="552791"/>
+            <a:ext cx="6444969" cy="523220"/>
+          </a:xfrm>
+          <a:prstGeom prst="rect">
+            <a:avLst/>
+          </a:prstGeom>
+          <a:noFill/>
+        </p:spPr>
+        <p:txBody>
+          <a:bodyPr wrap="none" rtlCol="0">
+            <a:spAutoFit/>
+          </a:bodyPr>
+          <a:lstStyle/>
+          <a:p>
+            <a:r>
+              <a:rPr lang="en-US" sz="2800" dirty="0">
+                <a:solidFill>
+                  <a:srgbClr val="FF0000"/>
+                </a:solidFill>
+              </a:rPr>
+              <a:t>NOISY HOBO LOGGER DATA WITH MICROS!</a:t>
+            </a:r>
+          </a:p>
+        </p:txBody>
+      </p:sp>
+      <p:pic>
+        <p:nvPicPr>
+          <p:cNvPr id="9" name="Content Placeholder 8">
+            <a:extLst>
+              <a:ext uri="{FF2B5EF4-FFF2-40B4-BE49-F238E27FC236}">
+                <a16:creationId xmlns:a16="http://schemas.microsoft.com/office/drawing/2014/main" id="{302C4666-8A51-A84E-8F08-052A2C1C6B70}"/>
+              </a:ext>
+            </a:extLst>
+          </p:cNvPr>
+          <p:cNvPicPr>
+            <a:picLocks noGrp="1" noChangeAspect="1"/>
+          </p:cNvPicPr>
+          <p:nvPr>
+            <p:ph idx="1"/>
+          </p:nvPr>
+        </p:nvPicPr>
+        <p:blipFill>
+          <a:blip r:embed="rId2"/>
+          <a:stretch>
+            <a:fillRect/>
+          </a:stretch>
+        </p:blipFill>
+        <p:spPr>
+          <a:xfrm>
+            <a:off x="6575284" y="857263"/>
+            <a:ext cx="5486400" cy="3657600"/>
+          </a:xfrm>
+        </p:spPr>
+      </p:pic>
+      <p:pic>
+        <p:nvPicPr>
+          <p:cNvPr id="12" name="Picture 11">
+            <a:extLst>
+              <a:ext uri="{FF2B5EF4-FFF2-40B4-BE49-F238E27FC236}">
+                <a16:creationId xmlns:a16="http://schemas.microsoft.com/office/drawing/2014/main" id="{76919083-914E-F244-A45D-12AF8420981D}"/>
+              </a:ext>
+            </a:extLst>
+          </p:cNvPr>
+          <p:cNvPicPr>
+            <a:picLocks noChangeAspect="1"/>
+          </p:cNvPicPr>
+          <p:nvPr/>
+        </p:nvPicPr>
+        <p:blipFill>
+          <a:blip r:embed="rId3"/>
+          <a:stretch>
+            <a:fillRect/>
+          </a:stretch>
+        </p:blipFill>
+        <p:spPr>
+          <a:xfrm>
+            <a:off x="6575284" y="3705216"/>
+            <a:ext cx="5486400" cy="3657600"/>
+          </a:xfrm>
+          <a:prstGeom prst="rect">
+            <a:avLst/>
+          </a:prstGeom>
+        </p:spPr>
+      </p:pic>
+      <p:pic>
+        <p:nvPicPr>
+          <p:cNvPr id="15" name="Picture 14">
+            <a:extLst>
+              <a:ext uri="{FF2B5EF4-FFF2-40B4-BE49-F238E27FC236}">
+                <a16:creationId xmlns:a16="http://schemas.microsoft.com/office/drawing/2014/main" id="{8D307F74-5138-AD4C-9E08-0D491DB7F49E}"/>
+              </a:ext>
+            </a:extLst>
+          </p:cNvPr>
+          <p:cNvPicPr>
+            <a:picLocks noChangeAspect="1"/>
+          </p:cNvPicPr>
+          <p:nvPr/>
+        </p:nvPicPr>
+        <p:blipFill>
+          <a:blip r:embed="rId4"/>
+          <a:stretch>
+            <a:fillRect/>
+          </a:stretch>
+        </p:blipFill>
+        <p:spPr>
+          <a:xfrm>
+            <a:off x="-257175" y="1787751"/>
+            <a:ext cx="7476744" cy="4272425"/>
+          </a:xfrm>
+          <a:prstGeom prst="rect">
+            <a:avLst/>
+          </a:prstGeom>
+        </p:spPr>
+      </p:pic>
+    </p:spTree>
+    <p:extLst>
+      <p:ext uri="{BB962C8B-B14F-4D97-AF65-F5344CB8AC3E}">
+        <p14:creationId xmlns:p14="http://schemas.microsoft.com/office/powerpoint/2010/main" val="430784412"/>
+      </p:ext>
+    </p:extLst>
+  </p:cSld>
+  <p:clrMapOvr>
+    <a:masterClrMapping/>
+  </p:clrMapOvr>
+</p:sld>
+</file>
+
+<file path=ppt/slides/slide14.xml><?xml version="1.0" encoding="utf-8"?>
+<p:sld xmlns:a="http://schemas.openxmlformats.org/drawingml/2006/main" xmlns:r="http://schemas.openxmlformats.org/officeDocument/2006/relationships" xmlns:p="http://schemas.openxmlformats.org/presentationml/2006/main">
+  <p:cSld>
+    <p:spTree>
+      <p:nvGrpSpPr>
+        <p:cNvPr id="1" name=""/>
+        <p:cNvGrpSpPr/>
+        <p:nvPr/>
+      </p:nvGrpSpPr>
+      <p:grpSpPr>
+        <a:xfrm>
+          <a:off x="0" y="0"/>
+          <a:ext cx="0" cy="0"/>
+          <a:chOff x="0" y="0"/>
+          <a:chExt cx="0" cy="0"/>
+        </a:xfrm>
+      </p:grpSpPr>
+      <p:sp>
+        <p:nvSpPr>
+          <p:cNvPr id="2" name="Title 1">
+            <a:extLst>
+              <a:ext uri="{FF2B5EF4-FFF2-40B4-BE49-F238E27FC236}">
+                <a16:creationId xmlns:a16="http://schemas.microsoft.com/office/drawing/2014/main" id="{5127BE94-0831-6449-98B3-24BFCC8F53C6}"/>
+              </a:ext>
+            </a:extLst>
+          </p:cNvPr>
+          <p:cNvSpPr>
+            <a:spLocks noGrp="1"/>
+          </p:cNvSpPr>
+          <p:nvPr>
+            <p:ph type="title"/>
+          </p:nvPr>
+        </p:nvSpPr>
+        <p:spPr/>
+        <p:txBody>
+          <a:bodyPr/>
+          <a:lstStyle/>
+          <a:p>
+            <a:r>
+              <a:rPr lang="en-US" dirty="0"/>
+              <a:t>Next, I want to remove the noisy WS or noisy Hobo logger and just have microclimates...</a:t>
+            </a:r>
+          </a:p>
+        </p:txBody>
+      </p:sp>
+      <p:sp>
+        <p:nvSpPr>
+          <p:cNvPr id="3" name="Content Placeholder 2">
+            <a:extLst>
+              <a:ext uri="{FF2B5EF4-FFF2-40B4-BE49-F238E27FC236}">
+                <a16:creationId xmlns:a16="http://schemas.microsoft.com/office/drawing/2014/main" id="{15482D7F-0CD6-A448-BDDD-C24EBE2C07D8}"/>
+              </a:ext>
+            </a:extLst>
+          </p:cNvPr>
+          <p:cNvSpPr>
+            <a:spLocks noGrp="1"/>
+          </p:cNvSpPr>
+          <p:nvPr>
+            <p:ph idx="1"/>
+          </p:nvPr>
+        </p:nvSpPr>
+        <p:spPr/>
+        <p:txBody>
+          <a:bodyPr/>
+          <a:lstStyle/>
+          <a:p>
+            <a:r>
+              <a:rPr lang="en-US" dirty="0"/>
+              <a:t>The way I do this is I add variation around the microsites at both the Arb and the Forest...</a:t>
+            </a:r>
+          </a:p>
+        </p:txBody>
+      </p:sp>
+      <p:pic>
+        <p:nvPicPr>
+          <p:cNvPr id="5" name="Picture 4">
+            <a:extLst>
+              <a:ext uri="{FF2B5EF4-FFF2-40B4-BE49-F238E27FC236}">
+                <a16:creationId xmlns:a16="http://schemas.microsoft.com/office/drawing/2014/main" id="{C531CA3C-3DA3-3745-BD52-294327B7CB64}"/>
+              </a:ext>
+            </a:extLst>
+          </p:cNvPr>
+          <p:cNvPicPr>
+            <a:picLocks noChangeAspect="1"/>
+          </p:cNvPicPr>
+          <p:nvPr/>
+        </p:nvPicPr>
+        <p:blipFill>
+          <a:blip r:embed="rId2"/>
+          <a:stretch>
+            <a:fillRect/>
+          </a:stretch>
+        </p:blipFill>
+        <p:spPr>
+          <a:xfrm>
+            <a:off x="-404813" y="2333625"/>
+            <a:ext cx="7592615" cy="4338637"/>
+          </a:xfrm>
+          <a:prstGeom prst="rect">
+            <a:avLst/>
+          </a:prstGeom>
+        </p:spPr>
+      </p:pic>
+      <p:pic>
+        <p:nvPicPr>
+          <p:cNvPr id="7" name="Picture 6">
+            <a:extLst>
+              <a:ext uri="{FF2B5EF4-FFF2-40B4-BE49-F238E27FC236}">
+                <a16:creationId xmlns:a16="http://schemas.microsoft.com/office/drawing/2014/main" id="{7CB9F535-9015-374C-912E-E523B0E3ECA6}"/>
+              </a:ext>
+            </a:extLst>
+          </p:cNvPr>
+          <p:cNvPicPr>
+            <a:picLocks noChangeAspect="1"/>
+          </p:cNvPicPr>
+          <p:nvPr/>
+        </p:nvPicPr>
+        <p:blipFill>
+          <a:blip r:embed="rId3"/>
+          <a:stretch>
+            <a:fillRect/>
+          </a:stretch>
+        </p:blipFill>
+        <p:spPr>
+          <a:xfrm>
+            <a:off x="6782394" y="4007643"/>
+            <a:ext cx="4976814" cy="3317876"/>
+          </a:xfrm>
+          <a:prstGeom prst="rect">
+            <a:avLst/>
+          </a:prstGeom>
+        </p:spPr>
+      </p:pic>
+      <p:pic>
+        <p:nvPicPr>
+          <p:cNvPr id="9" name="Picture 8">
+            <a:extLst>
+              <a:ext uri="{FF2B5EF4-FFF2-40B4-BE49-F238E27FC236}">
+                <a16:creationId xmlns:a16="http://schemas.microsoft.com/office/drawing/2014/main" id="{B3CAA221-BC9A-EF42-B714-0B1C5E36C48D}"/>
+              </a:ext>
+            </a:extLst>
+          </p:cNvPr>
+          <p:cNvPicPr>
+            <a:picLocks noChangeAspect="1"/>
+          </p:cNvPicPr>
+          <p:nvPr/>
+        </p:nvPicPr>
+        <p:blipFill>
+          <a:blip r:embed="rId4"/>
+          <a:stretch>
+            <a:fillRect/>
+          </a:stretch>
+        </p:blipFill>
+        <p:spPr>
+          <a:xfrm>
+            <a:off x="6782394" y="1690688"/>
+            <a:ext cx="4976813" cy="3317875"/>
+          </a:xfrm>
+          <a:prstGeom prst="rect">
+            <a:avLst/>
+          </a:prstGeom>
+        </p:spPr>
+      </p:pic>
+      <p:sp>
+        <p:nvSpPr>
+          <p:cNvPr id="10" name="TextBox 9">
+            <a:extLst>
+              <a:ext uri="{FF2B5EF4-FFF2-40B4-BE49-F238E27FC236}">
+                <a16:creationId xmlns:a16="http://schemas.microsoft.com/office/drawing/2014/main" id="{64BAE524-6AC6-0B4C-AEDB-110E13C3D35F}"/>
+              </a:ext>
+            </a:extLst>
+          </p:cNvPr>
+          <p:cNvSpPr txBox="1"/>
+          <p:nvPr/>
+        </p:nvSpPr>
+        <p:spPr>
+          <a:xfrm>
+            <a:off x="8267701" y="4834572"/>
+            <a:ext cx="2057400" cy="1477328"/>
+          </a:xfrm>
+          <a:prstGeom prst="rect">
+            <a:avLst/>
+          </a:prstGeom>
+          <a:noFill/>
+        </p:spPr>
+        <p:txBody>
+          <a:bodyPr wrap="square" rtlCol="0">
+            <a:spAutoFit/>
+          </a:bodyPr>
+          <a:lstStyle/>
+          <a:p>
+            <a:pPr algn="ctr"/>
+            <a:r>
+              <a:rPr lang="en-US" dirty="0">
+                <a:solidFill>
+                  <a:srgbClr val="FF0000"/>
+                </a:solidFill>
+              </a:rPr>
+              <a:t>This is NOT what I was hoping for... I wanted Hobo loggers to be better estimates of GDD</a:t>
+            </a:r>
+          </a:p>
+        </p:txBody>
+      </p:sp>
+    </p:spTree>
+    <p:extLst>
+      <p:ext uri="{BB962C8B-B14F-4D97-AF65-F5344CB8AC3E}">
+        <p14:creationId xmlns:p14="http://schemas.microsoft.com/office/powerpoint/2010/main" val="3144544946"/>
+      </p:ext>
+    </p:extLst>
+  </p:cSld>
+  <p:clrMapOvr>
+    <a:masterClrMapping/>
+  </p:clrMapOvr>
+</p:sld>
+</file>
+
 <file path=ppt/slides/slide2.xml><?xml version="1.0" encoding="utf-8"?>
 <p:sld xmlns:a="http://schemas.openxmlformats.org/drawingml/2006/main" xmlns:r="http://schemas.openxmlformats.org/officeDocument/2006/relationships" xmlns:p="http://schemas.openxmlformats.org/presentationml/2006/main">
   <p:cSld>

</xml_diff>